<commit_message>
vault backup: 2024-10-10 20:11:22
</commit_message>
<xml_diff>
--- a/SEM5/COSC350/LANs.pptx
+++ b/SEM5/COSC350/LANs.pptx
@@ -5,7 +5,7 @@
     <p:sldMasterId id="2147483759" r:id="rId1"/>
   </p:sldMasterIdLst>
   <p:notesMasterIdLst>
-    <p:notesMasterId r:id="rId42"/>
+    <p:notesMasterId r:id="rId43"/>
   </p:notesMasterIdLst>
   <p:sldIdLst>
     <p:sldId id="326" r:id="rId2"/>
@@ -48,6 +48,7 @@
     <p:sldId id="356" r:id="rId39"/>
     <p:sldId id="357" r:id="rId40"/>
     <p:sldId id="338" r:id="rId41"/>
+    <p:sldId id="361" r:id="rId42"/>
   </p:sldIdLst>
   <p:sldSz cx="5486400" cy="4572000"/>
   <p:notesSz cx="6858000" cy="9144000"/>
@@ -9863,7 +9864,7 @@
             </a:pPr>
             <a:fld id="{A67113F0-0DB4-4E5F-B756-8762BA275270}" type="datetime1">
               <a:rPr lang="en-US" smtClean="0"/>
-              <a:t>10/7/2024</a:t>
+              <a:t>10/9/2024</a:t>
             </a:fld>
             <a:endParaRPr lang="en-US"/>
           </a:p>
@@ -10067,7 +10068,7 @@
             </a:pPr>
             <a:fld id="{05698EA9-8B19-4272-9273-474A2DA4D5B6}" type="datetime1">
               <a:rPr lang="en-US" smtClean="0"/>
-              <a:t>10/7/2024</a:t>
+              <a:t>10/9/2024</a:t>
             </a:fld>
             <a:endParaRPr lang="en-US"/>
           </a:p>
@@ -10256,7 +10257,7 @@
             </a:pPr>
             <a:fld id="{FF635BA9-5DF3-4851-9AA0-86A56E4B1678}" type="datetime1">
               <a:rPr lang="en-US" smtClean="0"/>
-              <a:t>10/7/2024</a:t>
+              <a:t>10/9/2024</a:t>
             </a:fld>
             <a:endParaRPr lang="en-US"/>
           </a:p>
@@ -10641,7 +10642,7 @@
             </a:pPr>
             <a:fld id="{9D46B550-8DBE-402D-B138-D0C2016CF598}" type="datetime1">
               <a:rPr lang="en-US" smtClean="0"/>
-              <a:t>10/7/2024</a:t>
+              <a:t>10/9/2024</a:t>
             </a:fld>
             <a:endParaRPr lang="en-US"/>
           </a:p>
@@ -10901,7 +10902,7 @@
             </a:pPr>
             <a:fld id="{FD932AB4-9C02-44D0-ADFB-6EDA6410CA92}" type="datetime1">
               <a:rPr lang="en-US" smtClean="0"/>
-              <a:t>10/7/2024</a:t>
+              <a:t>10/9/2024</a:t>
             </a:fld>
             <a:endParaRPr lang="en-US"/>
           </a:p>
@@ -11315,7 +11316,7 @@
             </a:pPr>
             <a:fld id="{2E8701D0-4A31-4C9A-B752-A6150651753F}" type="datetime1">
               <a:rPr lang="en-US" smtClean="0"/>
-              <a:t>10/7/2024</a:t>
+              <a:t>10/9/2024</a:t>
             </a:fld>
             <a:endParaRPr lang="en-US"/>
           </a:p>
@@ -11766,7 +11767,7 @@
             </a:pPr>
             <a:fld id="{35E7A175-AB5D-49CC-829A-8A0E7B4ED71F}" type="datetime1">
               <a:rPr lang="en-US" smtClean="0"/>
-              <a:t>10/7/2024</a:t>
+              <a:t>10/9/2024</a:t>
             </a:fld>
             <a:endParaRPr lang="en-US"/>
           </a:p>
@@ -11876,7 +11877,7 @@
             </a:pPr>
             <a:fld id="{5AB5F747-437F-484F-B26C-CC2F56C98D64}" type="datetime1">
               <a:rPr lang="en-US" smtClean="0"/>
-              <a:t>10/7/2024</a:t>
+              <a:t>10/9/2024</a:t>
             </a:fld>
             <a:endParaRPr lang="en-US"/>
           </a:p>
@@ -12003,7 +12004,7 @@
             </a:pPr>
             <a:fld id="{3B47D262-07FA-4688-8F71-BC7EFFB2A9FD}" type="datetime1">
               <a:rPr lang="en-US" smtClean="0"/>
-              <a:t>10/7/2024</a:t>
+              <a:t>10/9/2024</a:t>
             </a:fld>
             <a:endParaRPr lang="en-US"/>
           </a:p>
@@ -12285,7 +12286,7 @@
             </a:pPr>
             <a:fld id="{CE005EAC-04C3-437B-971E-EB3F65390834}" type="datetime1">
               <a:rPr lang="en-US" smtClean="0"/>
-              <a:t>10/7/2024</a:t>
+              <a:t>10/9/2024</a:t>
             </a:fld>
             <a:endParaRPr lang="en-US"/>
           </a:p>
@@ -12501,7 +12502,7 @@
             </a:pPr>
             <a:fld id="{63F5DCE3-75BB-4ACB-AD58-36DE8783EB13}" type="datetime1">
               <a:rPr lang="en-US" smtClean="0"/>
-              <a:t>10/7/2024</a:t>
+              <a:t>10/9/2024</a:t>
             </a:fld>
             <a:endParaRPr lang="en-US"/>
           </a:p>
@@ -13602,7 +13603,7 @@
             </a:pPr>
             <a:fld id="{78794899-9342-481A-A235-784E5AF6A05B}" type="datetime1">
               <a:rPr lang="en-US" smtClean="0"/>
-              <a:t>10/7/2024</a:t>
+              <a:t>10/9/2024</a:t>
             </a:fld>
             <a:endParaRPr lang="en-US"/>
           </a:p>
@@ -14225,7 +14226,7 @@
             </a:pPr>
             <a:fld id="{EADEE815-6DA2-4F81-A27B-9AF52E63D3F4}" type="datetime1">
               <a:rPr lang="en-US" smtClean="0"/>
-              <a:t>10/7/2024</a:t>
+              <a:t>10/9/2024</a:t>
             </a:fld>
             <a:endParaRPr lang="en-US"/>
           </a:p>
@@ -14551,7 +14552,7 @@
             </a:pPr>
             <a:fld id="{B27B309A-ECDB-46B9-B39C-01E2B893AFD1}" type="datetime1">
               <a:rPr lang="en-US" smtClean="0"/>
-              <a:t>10/7/2024</a:t>
+              <a:t>10/9/2024</a:t>
             </a:fld>
             <a:endParaRPr lang="en-US"/>
           </a:p>
@@ -14869,7 +14870,7 @@
             </a:pPr>
             <a:fld id="{2F0BF132-346C-43B7-AC02-BD213BF76268}" type="datetime1">
               <a:rPr lang="en-US" smtClean="0"/>
-              <a:t>10/7/2024</a:t>
+              <a:t>10/9/2024</a:t>
             </a:fld>
             <a:endParaRPr lang="en-US"/>
           </a:p>
@@ -14942,7 +14943,9 @@
           </a:xfrm>
         </p:spPr>
         <p:txBody>
-          <a:bodyPr/>
+          <a:bodyPr>
+            <a:normAutofit fontScale="92500" lnSpcReduction="10000"/>
+          </a:bodyPr>
           <a:lstStyle/>
           <a:p>
             <a:pPr eaLnBrk="1" hangingPunct="1"/>
@@ -14986,24 +14989,22 @@
             </a:r>
             <a:r>
               <a:rPr lang="en-US" sz="1200" dirty="0"/>
-              <a:t>(LLC)</a:t>
+              <a:t>(LLC) </a:t>
             </a:r>
           </a:p>
           <a:p>
             <a:pPr lvl="2" eaLnBrk="1" hangingPunct="1"/>
             <a:r>
-              <a:rPr lang="en-US" sz="1100" dirty="0" err="1"/>
-              <a:t>sublayer</a:t>
-            </a:r>
-            <a:r>
               <a:rPr lang="en-US" sz="1100" dirty="0"/>
-              <a:t> specifies addressing and the use of addresses for </a:t>
-            </a:r>
-            <a:r>
-              <a:rPr lang="en-US" sz="1100" dirty="0" err="1"/>
-              <a:t>demultiplexing</a:t>
-            </a:r>
-            <a:endParaRPr lang="en-US" sz="1100" dirty="0"/>
+              <a:t>Provides flow control, error detection (use of checksum and CRC) to the frames, multiplexing, and addressing between higher and lower layers </a:t>
+            </a:r>
+          </a:p>
+          <a:p>
+            <a:pPr lvl="2" eaLnBrk="1" hangingPunct="1"/>
+            <a:r>
+              <a:rPr lang="en-US" sz="1100" dirty="0"/>
+              <a:t>Supports multiple network protocols by adding LLC headers and using service access points (DSAP and SSAP) – which network protocol the frame belongs to</a:t>
+            </a:r>
           </a:p>
           <a:p>
             <a:pPr lvl="1" eaLnBrk="1" hangingPunct="1"/>
@@ -15283,7 +15284,7 @@
             </a:pPr>
             <a:fld id="{A511BBA7-51F0-438C-9619-5422E05D8D56}" type="datetime1">
               <a:rPr lang="en-US" smtClean="0"/>
-              <a:t>10/7/2024</a:t>
+              <a:t>10/9/2024</a:t>
             </a:fld>
             <a:endParaRPr lang="en-US"/>
           </a:p>
@@ -15642,7 +15643,7 @@
             </a:pPr>
             <a:fld id="{22930789-A4C8-4F6B-9C10-9AB130CC249F}" type="datetime1">
               <a:rPr lang="en-US" smtClean="0"/>
-              <a:t>10/7/2024</a:t>
+              <a:t>10/9/2024</a:t>
             </a:fld>
             <a:endParaRPr lang="en-US"/>
           </a:p>
@@ -16162,7 +16163,7 @@
             </a:pPr>
             <a:fld id="{BF10D0D3-11BC-4A75-A5DF-FCF235901EF8}" type="datetime1">
               <a:rPr lang="en-US" smtClean="0"/>
-              <a:t>10/7/2024</a:t>
+              <a:t>10/9/2024</a:t>
             </a:fld>
             <a:endParaRPr lang="en-US"/>
           </a:p>
@@ -16244,7 +16245,7 @@
             </a:pPr>
             <a:fld id="{3B47D262-07FA-4688-8F71-BC7EFFB2A9FD}" type="datetime1">
               <a:rPr lang="en-US" smtClean="0"/>
-              <a:t>10/7/2024</a:t>
+              <a:t>10/9/2024</a:t>
             </a:fld>
             <a:endParaRPr lang="en-US"/>
           </a:p>
@@ -17912,7 +17913,7 @@
             </a:pPr>
             <a:fld id="{62FC3557-FD29-4841-8C14-9951FB7A93BF}" type="datetime1">
               <a:rPr lang="en-US" smtClean="0"/>
-              <a:t>10/7/2024</a:t>
+              <a:t>10/9/2024</a:t>
             </a:fld>
             <a:endParaRPr lang="en-US"/>
           </a:p>
@@ -17990,18 +17991,18 @@
           <a:p>
             <a:pPr eaLnBrk="1" hangingPunct="1"/>
             <a:r>
-              <a:rPr lang="en-US" sz="1400"/>
+              <a:rPr lang="en-US" sz="1400" dirty="0"/>
               <a:t>Many LAN technologies exist</a:t>
             </a:r>
           </a:p>
           <a:p>
             <a:pPr eaLnBrk="1" hangingPunct="1"/>
             <a:r>
-              <a:rPr lang="en-US" sz="1400"/>
+              <a:rPr lang="en-US" sz="1400" dirty="0"/>
               <a:t>Each network is classified into a category according to its  </a:t>
             </a:r>
             <a:r>
-              <a:rPr lang="en-US" sz="1400">
+              <a:rPr lang="en-US" sz="1400" dirty="0">
                 <a:solidFill>
                   <a:srgbClr val="FF0000"/>
                 </a:solidFill>
@@ -18009,11 +18010,11 @@
               <a:t>topology</a:t>
             </a:r>
             <a:r>
-              <a:rPr lang="en-US" sz="1400"/>
+              <a:rPr lang="en-US" sz="1400" dirty="0"/>
               <a:t> or </a:t>
             </a:r>
             <a:r>
-              <a:rPr lang="en-US" sz="1400">
+              <a:rPr lang="en-US" sz="1400" dirty="0">
                 <a:solidFill>
                   <a:srgbClr val="FF0000"/>
                 </a:solidFill>
@@ -18024,36 +18025,50 @@
           <a:p>
             <a:pPr eaLnBrk="1" hangingPunct="1"/>
             <a:r>
-              <a:rPr lang="en-US" sz="1400"/>
+              <a:rPr lang="en-US" sz="1400" dirty="0"/>
               <a:t>This section describes four basic topologies that are used to construct</a:t>
             </a:r>
           </a:p>
           <a:p>
             <a:pPr lvl="1" eaLnBrk="1" hangingPunct="1"/>
             <a:r>
-              <a:rPr lang="en-US" sz="1200"/>
+              <a:rPr lang="en-US" sz="1200" dirty="0"/>
               <a:t> 13.8.1  Bus Topology    </a:t>
             </a:r>
           </a:p>
           <a:p>
             <a:pPr lvl="1" eaLnBrk="1" hangingPunct="1"/>
             <a:r>
-              <a:rPr lang="en-US" sz="1200"/>
+              <a:rPr lang="en-US" sz="1200" dirty="0"/>
               <a:t> 13.8.2  Ring Topology    </a:t>
             </a:r>
           </a:p>
           <a:p>
             <a:pPr lvl="1" eaLnBrk="1" hangingPunct="1"/>
             <a:r>
-              <a:rPr lang="en-US" sz="1200"/>
+              <a:rPr lang="en-US" sz="1200" dirty="0"/>
               <a:t> 13.8.3  Mesh Topology    </a:t>
             </a:r>
           </a:p>
           <a:p>
             <a:pPr lvl="1" eaLnBrk="1" hangingPunct="1"/>
             <a:r>
-              <a:rPr lang="en-US" sz="1200"/>
-              <a:t> 13.8.4  Star Topology    </a:t>
+              <a:rPr lang="en-US" sz="1200" dirty="0"/>
+              <a:t> 13.8.4  Star Topology </a:t>
+            </a:r>
+          </a:p>
+          <a:p>
+            <a:pPr lvl="1" eaLnBrk="1" hangingPunct="1"/>
+            <a:r>
+              <a:rPr lang="en-US" sz="1200" dirty="0"/>
+              <a:t>Tree topology – scalable &amp; flexible but root node failure disrupts the network</a:t>
+            </a:r>
+          </a:p>
+          <a:p>
+            <a:pPr lvl="1" eaLnBrk="1" hangingPunct="1"/>
+            <a:r>
+              <a:rPr lang="en-US" sz="1200" dirty="0"/>
+              <a:t>Hybrid   topology – combination of topologies, flexible, complex design and management</a:t>
             </a:r>
           </a:p>
         </p:txBody>
@@ -18250,7 +18265,7 @@
             </a:pPr>
             <a:fld id="{B344EDBC-8D50-4229-A01A-85A9B2C5377B}" type="datetime1">
               <a:rPr lang="en-US" smtClean="0"/>
-              <a:t>10/7/2024</a:t>
+              <a:t>10/9/2024</a:t>
             </a:fld>
             <a:endParaRPr lang="en-US"/>
           </a:p>
@@ -18344,7 +18359,10 @@
           <a:bodyPr/>
           <a:lstStyle/>
           <a:p>
-            <a:endParaRPr lang="en-US"/>
+            <a:pPr marL="68964" indent="0">
+              <a:buNone/>
+            </a:pPr>
+            <a:endParaRPr lang="en-US" dirty="0"/>
           </a:p>
         </p:txBody>
       </p:sp>
@@ -18515,8 +18533,8 @@
         </p:blipFill>
         <p:spPr bwMode="auto">
           <a:xfrm>
-            <a:off x="1006475" y="731837"/>
-            <a:ext cx="3519488" cy="3687763"/>
+            <a:off x="381000" y="1052690"/>
+            <a:ext cx="2728456" cy="2858910"/>
           </a:xfrm>
           <a:prstGeom prst="rect">
             <a:avLst/>
@@ -18566,7 +18584,7 @@
             </a:pPr>
             <a:fld id="{F0A49749-83DB-424B-864D-BC6E11DEDBFE}" type="datetime1">
               <a:rPr lang="en-US" smtClean="0"/>
-              <a:t>10/7/2024</a:t>
+              <a:t>10/9/2024</a:t>
             </a:fld>
             <a:endParaRPr lang="en-US"/>
           </a:p>
@@ -18593,6 +18611,88 @@
             <a:r>
               <a:rPr lang="en-US"/>
               <a:t>COSC350</a:t>
+            </a:r>
+          </a:p>
+        </p:txBody>
+      </p:sp>
+      <p:pic>
+        <p:nvPicPr>
+          <p:cNvPr id="1026" name="Picture 2" descr="Tree Topology Network Diagram Template | MyDraw">
+            <a:extLst>
+              <a:ext uri="{FF2B5EF4-FFF2-40B4-BE49-F238E27FC236}">
+                <a16:creationId xmlns:a16="http://schemas.microsoft.com/office/drawing/2014/main" id="{58E912DB-2F19-7660-0DB7-7A31C724786F}"/>
+              </a:ext>
+            </a:extLst>
+          </p:cNvPr>
+          <p:cNvPicPr>
+            <a:picLocks noChangeAspect="1" noChangeArrowheads="1"/>
+          </p:cNvPicPr>
+          <p:nvPr/>
+        </p:nvPicPr>
+        <p:blipFill>
+          <a:blip r:embed="rId4" cstate="print">
+            <a:extLst>
+              <a:ext uri="{28A0092B-C50C-407E-A947-70E740481C1C}">
+                <a14:useLocalDpi xmlns:a14="http://schemas.microsoft.com/office/drawing/2010/main" val="0"/>
+              </a:ext>
+            </a:extLst>
+          </a:blip>
+          <a:srcRect/>
+          <a:stretch>
+            <a:fillRect/>
+          </a:stretch>
+        </p:blipFill>
+        <p:spPr bwMode="auto">
+          <a:xfrm>
+            <a:off x="3132068" y="1305455"/>
+            <a:ext cx="2057400" cy="1454944"/>
+          </a:xfrm>
+          <a:prstGeom prst="rect">
+            <a:avLst/>
+          </a:prstGeom>
+          <a:noFill/>
+          <a:extLst>
+            <a:ext uri="{909E8E84-426E-40DD-AFC4-6F175D3DCCD1}">
+              <a14:hiddenFill xmlns:a14="http://schemas.microsoft.com/office/drawing/2010/main">
+                <a:solidFill>
+                  <a:srgbClr val="FFFFFF"/>
+                </a:solidFill>
+              </a14:hiddenFill>
+            </a:ext>
+          </a:extLst>
+        </p:spPr>
+      </p:pic>
+      <p:sp>
+        <p:nvSpPr>
+          <p:cNvPr id="5" name="TextBox 4">
+            <a:extLst>
+              <a:ext uri="{FF2B5EF4-FFF2-40B4-BE49-F238E27FC236}">
+                <a16:creationId xmlns:a16="http://schemas.microsoft.com/office/drawing/2014/main" id="{52F4A4D1-E9F3-1FBD-0B29-976FB981BE1A}"/>
+              </a:ext>
+            </a:extLst>
+          </p:cNvPr>
+          <p:cNvSpPr txBox="1"/>
+          <p:nvPr/>
+        </p:nvSpPr>
+        <p:spPr>
+          <a:xfrm>
+            <a:off x="4297781" y="1600200"/>
+            <a:ext cx="343364" cy="184666"/>
+          </a:xfrm>
+          <a:prstGeom prst="rect">
+            <a:avLst/>
+          </a:prstGeom>
+          <a:noFill/>
+        </p:spPr>
+        <p:txBody>
+          <a:bodyPr wrap="none" rtlCol="0">
+            <a:spAutoFit/>
+          </a:bodyPr>
+          <a:lstStyle/>
+          <a:p>
+            <a:r>
+              <a:rPr lang="en-US" sz="600" dirty="0"/>
+              <a:t>Tree</a:t>
             </a:r>
           </a:p>
         </p:txBody>
@@ -18941,7 +19041,7 @@
             </a:pPr>
             <a:fld id="{87355EE9-774C-4D5D-A39A-40F911500542}" type="datetime1">
               <a:rPr lang="en-US" smtClean="0"/>
-              <a:t>10/7/2024</a:t>
+              <a:t>10/9/2024</a:t>
             </a:fld>
             <a:endParaRPr lang="en-US"/>
           </a:p>
@@ -19322,7 +19422,7 @@
             </a:pPr>
             <a:fld id="{FCADD272-AF0C-454C-A984-3EB54540C1C8}" type="datetime1">
               <a:rPr lang="en-US" smtClean="0"/>
-              <a:t>10/7/2024</a:t>
+              <a:t>10/9/2024</a:t>
             </a:fld>
             <a:endParaRPr lang="en-US" dirty="0"/>
           </a:p>
@@ -19649,7 +19749,7 @@
             </a:pPr>
             <a:fld id="{6B00AA39-C1FA-4C09-B961-1B1257A7C33B}" type="datetime1">
               <a:rPr lang="en-US" smtClean="0"/>
-              <a:t>10/7/2024</a:t>
+              <a:t>10/9/2024</a:t>
             </a:fld>
             <a:endParaRPr lang="en-US"/>
           </a:p>
@@ -20061,7 +20161,7 @@
             </a:pPr>
             <a:fld id="{06003384-0DB0-45C9-9974-B99BF1467AA5}" type="datetime1">
               <a:rPr lang="en-US" smtClean="0"/>
-              <a:t>10/7/2024</a:t>
+              <a:t>10/9/2024</a:t>
             </a:fld>
             <a:endParaRPr lang="en-US"/>
           </a:p>
@@ -20414,7 +20514,7 @@
             </a:pPr>
             <a:fld id="{260F50EF-F304-47E6-979A-2AA1C78C6818}" type="datetime1">
               <a:rPr lang="en-US" smtClean="0"/>
-              <a:t>10/7/2024</a:t>
+              <a:t>10/9/2024</a:t>
             </a:fld>
             <a:endParaRPr lang="en-US"/>
           </a:p>
@@ -20763,7 +20863,7 @@
             </a:pPr>
             <a:fld id="{BFA1E5FB-7761-4685-8DDB-56950904BE67}" type="datetime1">
               <a:rPr lang="en-US" smtClean="0"/>
-              <a:t>10/7/2024</a:t>
+              <a:t>10/9/2024</a:t>
             </a:fld>
             <a:endParaRPr lang="en-US"/>
           </a:p>
@@ -21334,7 +21434,7 @@
             </a:pPr>
             <a:fld id="{9D46B550-8DBE-402D-B138-D0C2016CF598}" type="datetime1">
               <a:rPr lang="en-US" smtClean="0"/>
-              <a:t>10/7/2024</a:t>
+              <a:t>10/9/2024</a:t>
             </a:fld>
             <a:endParaRPr lang="en-US"/>
           </a:p>
@@ -21788,7 +21888,7 @@
             </a:pPr>
             <a:fld id="{64FCD217-BC0C-4655-9534-2F82AE0FF503}" type="datetime1">
               <a:rPr lang="en-US" smtClean="0"/>
-              <a:t>10/7/2024</a:t>
+              <a:t>10/9/2024</a:t>
             </a:fld>
             <a:endParaRPr lang="en-US"/>
           </a:p>
@@ -22187,7 +22287,7 @@
             </a:pPr>
             <a:fld id="{D51E27B1-4EF7-4460-BACB-D293806D7491}" type="datetime1">
               <a:rPr lang="en-US" smtClean="0"/>
-              <a:t>10/7/2024</a:t>
+              <a:t>10/9/2024</a:t>
             </a:fld>
             <a:endParaRPr lang="en-US"/>
           </a:p>
@@ -22603,7 +22703,7 @@
             </a:pPr>
             <a:fld id="{2894E039-FB6F-415F-A907-521ACE1E89D0}" type="datetime1">
               <a:rPr lang="en-US" smtClean="0"/>
-              <a:t>10/7/2024</a:t>
+              <a:t>10/9/2024</a:t>
             </a:fld>
             <a:endParaRPr lang="en-US"/>
           </a:p>
@@ -22944,7 +23044,7 @@
             </a:pPr>
             <a:fld id="{ABDA0B38-113E-43A6-925A-C1F152262CC5}" type="datetime1">
               <a:rPr lang="en-US" smtClean="0"/>
-              <a:t>10/7/2024</a:t>
+              <a:t>10/9/2024</a:t>
             </a:fld>
             <a:endParaRPr lang="en-US"/>
           </a:p>
@@ -23331,7 +23431,7 @@
             </a:pPr>
             <a:fld id="{CD76E2EE-82AF-4F10-8A7F-53E2DF132F2C}" type="datetime1">
               <a:rPr lang="en-US" smtClean="0"/>
-              <a:t>10/7/2024</a:t>
+              <a:t>10/9/2024</a:t>
             </a:fld>
             <a:endParaRPr lang="en-US"/>
           </a:p>
@@ -23647,7 +23747,7 @@
             </a:pPr>
             <a:fld id="{8F9150D7-4944-48A6-804E-97A781EC9FDE}" type="datetime1">
               <a:rPr lang="en-US" smtClean="0"/>
-              <a:t>10/7/2024</a:t>
+              <a:t>10/9/2024</a:t>
             </a:fld>
             <a:endParaRPr lang="en-US"/>
           </a:p>
@@ -24014,7 +24114,7 @@
             </a:pPr>
             <a:fld id="{772CC366-A150-4701-A114-54F0A18C3B09}" type="datetime1">
               <a:rPr lang="en-US" smtClean="0"/>
-              <a:t>10/7/2024</a:t>
+              <a:t>10/9/2024</a:t>
             </a:fld>
             <a:endParaRPr lang="en-US"/>
           </a:p>
@@ -24320,7 +24420,7 @@
             </a:pPr>
             <a:fld id="{0B9CB349-04F3-4D83-928D-1D8C46A95A98}" type="datetime1">
               <a:rPr lang="en-US" smtClean="0"/>
-              <a:t>10/7/2024</a:t>
+              <a:t>10/9/2024</a:t>
             </a:fld>
             <a:endParaRPr lang="en-US"/>
           </a:p>
@@ -25983,7 +26083,7 @@
             </a:pPr>
             <a:fld id="{D95BC81B-1683-4F93-81F9-E185DF6B151E}" type="datetime1">
               <a:rPr lang="en-US" smtClean="0"/>
-              <a:t>10/7/2024</a:t>
+              <a:t>10/9/2024</a:t>
             </a:fld>
             <a:endParaRPr lang="en-US"/>
           </a:p>
@@ -26342,7 +26442,7 @@
             </a:pPr>
             <a:fld id="{30EAA301-10BE-4695-80B5-7A9F538F9220}" type="datetime1">
               <a:rPr lang="en-US" smtClean="0"/>
-              <a:t>10/7/2024</a:t>
+              <a:t>10/9/2024</a:t>
             </a:fld>
             <a:endParaRPr lang="en-US"/>
           </a:p>
@@ -26741,7 +26841,7 @@
             </a:pPr>
             <a:fld id="{4BD66B20-26C8-423F-B70E-1A43178A30D4}" type="datetime1">
               <a:rPr lang="en-US" smtClean="0"/>
-              <a:t>10/7/2024</a:t>
+              <a:t>10/9/2024</a:t>
             </a:fld>
             <a:endParaRPr lang="en-US"/>
           </a:p>
@@ -27135,7 +27235,7 @@
             </a:pPr>
             <a:fld id="{F0F57F6D-F1EA-4209-8703-680782C382C3}" type="datetime1">
               <a:rPr lang="en-US" smtClean="0"/>
-              <a:t>10/7/2024</a:t>
+              <a:t>10/9/2024</a:t>
             </a:fld>
             <a:endParaRPr lang="en-US"/>
           </a:p>
@@ -27520,7 +27620,7 @@
             </a:pPr>
             <a:fld id="{877D3AD5-1294-43B3-A185-DA442007848D}" type="datetime1">
               <a:rPr lang="en-US" smtClean="0"/>
-              <a:t>10/7/2024</a:t>
+              <a:t>10/9/2024</a:t>
             </a:fld>
             <a:endParaRPr lang="en-US"/>
           </a:p>
@@ -27879,7 +27979,7 @@
             </a:pPr>
             <a:fld id="{3E039611-74BE-4108-B377-D880D67D099A}" type="datetime1">
               <a:rPr lang="en-US" smtClean="0"/>
-              <a:t>10/7/2024</a:t>
+              <a:t>10/9/2024</a:t>
             </a:fld>
             <a:endParaRPr lang="en-US"/>
           </a:p>
@@ -28290,7 +28390,7 @@
             </a:pPr>
             <a:fld id="{807706DE-F734-444D-ADC8-FEE0C9E0640C}" type="datetime1">
               <a:rPr lang="en-US" smtClean="0"/>
-              <a:t>10/7/2024</a:t>
+              <a:t>10/9/2024</a:t>
             </a:fld>
             <a:endParaRPr lang="en-US"/>
           </a:p>
@@ -28755,7 +28855,7 @@
             </a:pPr>
             <a:fld id="{2EDC8608-56B2-4660-92CE-08033E6B820A}" type="datetime1">
               <a:rPr lang="en-US" smtClean="0"/>
-              <a:t>10/7/2024</a:t>
+              <a:t>10/9/2024</a:t>
             </a:fld>
             <a:endParaRPr lang="en-US"/>
           </a:p>
@@ -29130,7 +29230,7 @@
             </a:pPr>
             <a:fld id="{6CA4F5C3-4BEB-431B-990E-9913B938269F}" type="datetime1">
               <a:rPr lang="en-US" smtClean="0"/>
-              <a:t>10/7/2024</a:t>
+              <a:t>10/9/2024</a:t>
             </a:fld>
             <a:endParaRPr lang="en-US"/>
           </a:p>
@@ -29446,7 +29546,7 @@
             </a:pPr>
             <a:fld id="{9FC3806B-D729-4B83-A34A-D303F04DE991}" type="datetime1">
               <a:rPr lang="en-US" smtClean="0"/>
-              <a:t>10/7/2024</a:t>
+              <a:t>10/9/2024</a:t>
             </a:fld>
             <a:endParaRPr lang="en-US"/>
           </a:p>
@@ -29478,6 +29578,202 @@
         </p:txBody>
       </p:sp>
     </p:spTree>
+  </p:cSld>
+  <p:clrMapOvr>
+    <a:masterClrMapping/>
+  </p:clrMapOvr>
+</p:sld>
+</file>
+
+<file path=ppt/slides/slide41.xml><?xml version="1.0" encoding="utf-8"?>
+<p:sld xmlns:a="http://schemas.openxmlformats.org/drawingml/2006/main" xmlns:r="http://schemas.openxmlformats.org/officeDocument/2006/relationships" xmlns:p="http://schemas.openxmlformats.org/presentationml/2006/main">
+  <p:cSld>
+    <p:spTree>
+      <p:nvGrpSpPr>
+        <p:cNvPr id="1" name=""/>
+        <p:cNvGrpSpPr/>
+        <p:nvPr/>
+      </p:nvGrpSpPr>
+      <p:grpSpPr>
+        <a:xfrm>
+          <a:off x="0" y="0"/>
+          <a:ext cx="0" cy="0"/>
+          <a:chOff x="0" y="0"/>
+          <a:chExt cx="0" cy="0"/>
+        </a:xfrm>
+      </p:grpSpPr>
+      <p:sp>
+        <p:nvSpPr>
+          <p:cNvPr id="8" name="Content Placeholder 7">
+            <a:extLst>
+              <a:ext uri="{FF2B5EF4-FFF2-40B4-BE49-F238E27FC236}">
+                <a16:creationId xmlns:a16="http://schemas.microsoft.com/office/drawing/2014/main" id="{95C9FAFA-310A-3A5F-CC49-8BFF5764B3F2}"/>
+              </a:ext>
+            </a:extLst>
+          </p:cNvPr>
+          <p:cNvSpPr>
+            <a:spLocks noGrp="1"/>
+          </p:cNvSpPr>
+          <p:nvPr>
+            <p:ph idx="1"/>
+          </p:nvPr>
+        </p:nvSpPr>
+        <p:spPr/>
+        <p:txBody>
+          <a:bodyPr/>
+          <a:lstStyle/>
+          <a:p>
+            <a:r>
+              <a:rPr lang="en-US" dirty="0"/>
+              <a:t>Not to confused with control signals</a:t>
+            </a:r>
+          </a:p>
+          <a:p>
+            <a:r>
+              <a:rPr lang="en-US" dirty="0"/>
+              <a:t>Maintains synchronization: Prevent long sequences of the same bit value</a:t>
+            </a:r>
+          </a:p>
+          <a:p>
+            <a:r>
+              <a:rPr lang="en-US" dirty="0"/>
+              <a:t>Inserting extra, non-informational bits into the data stream to prevent misunderstanding, e.g., after 5 consecutive 1, insert one zero. Then the receiver removes it</a:t>
+            </a:r>
+          </a:p>
+        </p:txBody>
+      </p:sp>
+      <p:sp>
+        <p:nvSpPr>
+          <p:cNvPr id="4" name="Date Placeholder 3">
+            <a:extLst>
+              <a:ext uri="{FF2B5EF4-FFF2-40B4-BE49-F238E27FC236}">
+                <a16:creationId xmlns:a16="http://schemas.microsoft.com/office/drawing/2014/main" id="{13CF8428-7907-2FA3-EDED-16799CA9664F}"/>
+              </a:ext>
+            </a:extLst>
+          </p:cNvPr>
+          <p:cNvSpPr>
+            <a:spLocks noGrp="1"/>
+          </p:cNvSpPr>
+          <p:nvPr>
+            <p:ph type="dt" sz="half" idx="10"/>
+          </p:nvPr>
+        </p:nvSpPr>
+        <p:spPr/>
+        <p:txBody>
+          <a:bodyPr/>
+          <a:lstStyle/>
+          <a:p>
+            <a:pPr>
+              <a:defRPr/>
+            </a:pPr>
+            <a:fld id="{05698EA9-8B19-4272-9273-474A2DA4D5B6}" type="datetime1">
+              <a:rPr lang="en-US" smtClean="0"/>
+              <a:t>10/9/2024</a:t>
+            </a:fld>
+            <a:endParaRPr lang="en-US"/>
+          </a:p>
+        </p:txBody>
+      </p:sp>
+      <p:sp>
+        <p:nvSpPr>
+          <p:cNvPr id="5" name="Footer Placeholder 4">
+            <a:extLst>
+              <a:ext uri="{FF2B5EF4-FFF2-40B4-BE49-F238E27FC236}">
+                <a16:creationId xmlns:a16="http://schemas.microsoft.com/office/drawing/2014/main" id="{7DCDA1DE-FFFF-3199-9408-966CF23F3072}"/>
+              </a:ext>
+            </a:extLst>
+          </p:cNvPr>
+          <p:cNvSpPr>
+            <a:spLocks noGrp="1"/>
+          </p:cNvSpPr>
+          <p:nvPr>
+            <p:ph type="ftr" sz="quarter" idx="11"/>
+          </p:nvPr>
+        </p:nvSpPr>
+        <p:spPr/>
+        <p:txBody>
+          <a:bodyPr/>
+          <a:lstStyle/>
+          <a:p>
+            <a:pPr>
+              <a:defRPr/>
+            </a:pPr>
+            <a:r>
+              <a:rPr lang="en-US"/>
+              <a:t>COSC350</a:t>
+            </a:r>
+          </a:p>
+        </p:txBody>
+      </p:sp>
+      <p:sp>
+        <p:nvSpPr>
+          <p:cNvPr id="6" name="Slide Number Placeholder 5">
+            <a:extLst>
+              <a:ext uri="{FF2B5EF4-FFF2-40B4-BE49-F238E27FC236}">
+                <a16:creationId xmlns:a16="http://schemas.microsoft.com/office/drawing/2014/main" id="{94BF09C8-F79C-2176-B185-35EA76EFF74A}"/>
+              </a:ext>
+            </a:extLst>
+          </p:cNvPr>
+          <p:cNvSpPr>
+            <a:spLocks noGrp="1"/>
+          </p:cNvSpPr>
+          <p:nvPr>
+            <p:ph type="sldNum" sz="quarter" idx="12"/>
+          </p:nvPr>
+        </p:nvSpPr>
+        <p:spPr/>
+        <p:txBody>
+          <a:bodyPr/>
+          <a:lstStyle/>
+          <a:p>
+            <a:pPr>
+              <a:defRPr/>
+            </a:pPr>
+            <a:fld id="{8731C1D5-5971-4FC8-A269-4DE01D7159A7}" type="slidenum">
+              <a:rPr lang="en-US" smtClean="0"/>
+              <a:pPr>
+                <a:defRPr/>
+              </a:pPr>
+              <a:t>41</a:t>
+            </a:fld>
+            <a:endParaRPr lang="en-US"/>
+          </a:p>
+        </p:txBody>
+      </p:sp>
+      <p:sp>
+        <p:nvSpPr>
+          <p:cNvPr id="7" name="Title 6">
+            <a:extLst>
+              <a:ext uri="{FF2B5EF4-FFF2-40B4-BE49-F238E27FC236}">
+                <a16:creationId xmlns:a16="http://schemas.microsoft.com/office/drawing/2014/main" id="{FC71FFB0-631D-C016-91F2-44B98AD0FACE}"/>
+              </a:ext>
+            </a:extLst>
+          </p:cNvPr>
+          <p:cNvSpPr>
+            <a:spLocks noGrp="1"/>
+          </p:cNvSpPr>
+          <p:nvPr>
+            <p:ph type="title"/>
+          </p:nvPr>
+        </p:nvSpPr>
+        <p:spPr/>
+        <p:txBody>
+          <a:bodyPr/>
+          <a:lstStyle/>
+          <a:p>
+            <a:r>
+              <a:rPr lang="en-US" dirty="0"/>
+              <a:t>Bit stuffing</a:t>
+            </a:r>
+          </a:p>
+        </p:txBody>
+      </p:sp>
+    </p:spTree>
+    <p:extLst>
+      <p:ext uri="{BB962C8B-B14F-4D97-AF65-F5344CB8AC3E}">
+        <p14:creationId xmlns:p14="http://schemas.microsoft.com/office/powerpoint/2010/main" val="3818677459"/>
+      </p:ext>
+    </p:extLst>
   </p:cSld>
   <p:clrMapOvr>
     <a:masterClrMapping/>
@@ -29803,7 +30099,7 @@
             </a:pPr>
             <a:fld id="{A1613A23-81D0-4CA1-8C51-51681BF7C5DB}" type="datetime1">
               <a:rPr lang="en-US" smtClean="0"/>
-              <a:t>10/7/2024</a:t>
+              <a:t>10/9/2024</a:t>
             </a:fld>
             <a:endParaRPr lang="en-US"/>
           </a:p>
@@ -30206,7 +30502,7 @@
             </a:pPr>
             <a:fld id="{02F7F1AD-4800-49BC-AA09-267AA937CDE5}" type="datetime1">
               <a:rPr lang="en-US" smtClean="0"/>
-              <a:t>10/7/2024</a:t>
+              <a:t>10/9/2024</a:t>
             </a:fld>
             <a:endParaRPr lang="en-US"/>
           </a:p>
@@ -30553,7 +30849,7 @@
             </a:pPr>
             <a:fld id="{13708C0C-6DB7-45B0-B1E0-2D20322863D5}" type="datetime1">
               <a:rPr lang="en-US" smtClean="0"/>
-              <a:t>10/7/2024</a:t>
+              <a:t>10/9/2024</a:t>
             </a:fld>
             <a:endParaRPr lang="en-US"/>
           </a:p>
@@ -30899,7 +31195,7 @@
             </a:pPr>
             <a:fld id="{33EDC613-7941-47FB-A501-AAA2B514F2BE}" type="datetime1">
               <a:rPr lang="en-US" smtClean="0"/>
-              <a:t>10/7/2024</a:t>
+              <a:t>10/9/2024</a:t>
             </a:fld>
             <a:endParaRPr lang="en-US"/>
           </a:p>
@@ -31245,7 +31541,7 @@
             </a:pPr>
             <a:fld id="{918852EF-A704-40C3-A4B3-CFAB05368BEA}" type="datetime1">
               <a:rPr lang="en-US" smtClean="0"/>
-              <a:t>10/7/2024</a:t>
+              <a:t>10/9/2024</a:t>
             </a:fld>
             <a:endParaRPr lang="en-US"/>
           </a:p>

</xml_diff>